<commit_message>
Project slides and report updated.
</commit_message>
<xml_diff>
--- a/docs/AII - Project Slides.pptx
+++ b/docs/AII - Project Slides.pptx
@@ -32531,11 +32531,7 @@
             </a:r>
             <a:r>
               <a:rPr lang="it-IT" b="1" dirty="0"/>
-              <a:t> </a:t>
-            </a:r>
-            <a:r>
-              <a:rPr lang="it-IT" b="1" dirty="0" err="1"/>
-              <a:t>ReLU</a:t>
+              <a:t> ReLU</a:t>
             </a:r>
             <a:r>
               <a:rPr lang="it-IT" dirty="0"/>
@@ -32545,6 +32541,9 @@
               <a:rPr lang="it-IT" dirty="0" err="1"/>
               <a:t>effect</a:t>
             </a:r>
+            <a:br>
+              <a:rPr lang="it-IT" dirty="0"/>
+            </a:br>
             <a:endParaRPr lang="it-IT" dirty="0"/>
           </a:p>
           <a:p>
@@ -32648,56 +32647,10 @@
               <a:rPr lang="it-IT" dirty="0"/>
               <a:t> or false)</a:t>
             </a:r>
-          </a:p>
-          <a:p>
-            <a:pPr marL="476250">
-              <a:buSzPts val="2100"/>
-              <a:buFont typeface="Arial" panose="020B0604020202020204" pitchFamily="34" charset="0"/>
-              <a:buChar char="•"/>
-            </a:pPr>
-            <a:r>
-              <a:rPr lang="it-IT" b="1" dirty="0"/>
-              <a:t>ArcFace</a:t>
-            </a:r>
-            <a:r>
+            <a:br>
               <a:rPr lang="it-IT" dirty="0"/>
-              <a:t> Loss (</a:t>
-            </a:r>
-            <a:r>
-              <a:rPr lang="it-IT" dirty="0" err="1"/>
-              <a:t>true</a:t>
-            </a:r>
-            <a:r>
-              <a:rPr lang="it-IT" dirty="0"/>
-              <a:t> of false)</a:t>
-            </a:r>
-          </a:p>
-          <a:p>
-            <a:pPr marL="476250">
-              <a:buSzPts val="2100"/>
-              <a:buFont typeface="Arial" panose="020B0604020202020204" pitchFamily="34" charset="0"/>
-              <a:buChar char="•"/>
-            </a:pPr>
-            <a:r>
-              <a:rPr lang="it-IT" b="1" dirty="0" err="1"/>
-              <a:t>Epoch’s</a:t>
-            </a:r>
-            <a:r>
-              <a:rPr lang="it-IT" b="1" dirty="0"/>
-              <a:t> </a:t>
-            </a:r>
-            <a:r>
-              <a:rPr lang="it-IT" b="1" dirty="0" err="1"/>
-              <a:t>length</a:t>
-            </a:r>
-            <a:r>
-              <a:rPr lang="it-IT" b="1" dirty="0"/>
-              <a:t> </a:t>
-            </a:r>
-            <a:r>
-              <a:rPr lang="it-IT" dirty="0"/>
-              <a:t>(1 or 3)</a:t>
-            </a:r>
+            </a:br>
+            <a:endParaRPr lang="it-IT" dirty="0"/>
           </a:p>
           <a:p>
             <a:pPr marL="476250">
@@ -35659,6 +35612,41 @@
           </a:p>
         </p:txBody>
       </p:sp>
+      <p:pic>
+        <p:nvPicPr>
+          <p:cNvPr id="2" name="Picture 1">
+            <a:extLst>
+              <a:ext uri="{FF2B5EF4-FFF2-40B4-BE49-F238E27FC236}">
+                <a16:creationId xmlns:a16="http://schemas.microsoft.com/office/drawing/2014/main" id="{99CAE661-CB1F-12E2-ED43-03247CEFF2DC}"/>
+              </a:ext>
+            </a:extLst>
+          </p:cNvPr>
+          <p:cNvPicPr>
+            <a:picLocks noChangeAspect="1"/>
+          </p:cNvPicPr>
+          <p:nvPr/>
+        </p:nvPicPr>
+        <p:blipFill>
+          <a:blip r:embed="rId3"/>
+          <a:stretch>
+            <a:fillRect/>
+          </a:stretch>
+        </p:blipFill>
+        <p:spPr>
+          <a:xfrm>
+            <a:off x="6030722" y="3749152"/>
+            <a:ext cx="2484628" cy="883571"/>
+          </a:xfrm>
+          <a:prstGeom prst="rect">
+            <a:avLst/>
+          </a:prstGeom>
+          <a:ln w="19050">
+            <a:solidFill>
+              <a:srgbClr val="C00000"/>
+            </a:solidFill>
+          </a:ln>
+        </p:spPr>
+      </p:pic>
     </p:spTree>
   </p:cSld>
   <p:clrMapOvr>

</xml_diff>